<commit_message>
Foreløpig versjon av presentasjonen
Kan oppstå endringer, men tror denne er noenlunde komplett og greit for
presenteringen av prosjektet.
</commit_message>
<xml_diff>
--- a/Presentasjon av bachelorprosjekt/Presentasjon av Bacheloroppgave.pptx
+++ b/Presentasjon av bachelorprosjekt/Presentasjon av Bacheloroppgave.pptx
@@ -302,7 +302,7 @@
           <a:p>
             <a:fld id="{D005D144-FE52-4B88-9017-A322AD8A2886}" type="datetimeFigureOut">
               <a:rPr lang="en-US" smtClean="0"/>
-              <a:t>11-Jan-17</a:t>
+              <a:t>1/11/17</a:t>
             </a:fld>
             <a:endParaRPr lang="en-US"/>
           </a:p>
@@ -640,7 +640,7 @@
           <a:p>
             <a:fld id="{D005D144-FE52-4B88-9017-A322AD8A2886}" type="datetimeFigureOut">
               <a:rPr lang="en-US" smtClean="0"/>
-              <a:t>11-Jan-17</a:t>
+              <a:t>1/11/17</a:t>
             </a:fld>
             <a:endParaRPr lang="en-US"/>
           </a:p>
@@ -1041,7 +1041,7 @@
           <a:p>
             <a:fld id="{D005D144-FE52-4B88-9017-A322AD8A2886}" type="datetimeFigureOut">
               <a:rPr lang="en-US" smtClean="0"/>
-              <a:t>11-Jan-17</a:t>
+              <a:t>1/11/17</a:t>
             </a:fld>
             <a:endParaRPr lang="en-US"/>
           </a:p>
@@ -1377,7 +1377,7 @@
           <a:p>
             <a:fld id="{D005D144-FE52-4B88-9017-A322AD8A2886}" type="datetimeFigureOut">
               <a:rPr lang="en-US" smtClean="0"/>
-              <a:t>11-Jan-17</a:t>
+              <a:t>1/11/17</a:t>
             </a:fld>
             <a:endParaRPr lang="en-US"/>
           </a:p>
@@ -1697,7 +1697,7 @@
           <a:p>
             <a:fld id="{D005D144-FE52-4B88-9017-A322AD8A2886}" type="datetimeFigureOut">
               <a:rPr lang="en-US" smtClean="0"/>
-              <a:t>11-Jan-17</a:t>
+              <a:t>1/11/17</a:t>
             </a:fld>
             <a:endParaRPr lang="en-US"/>
           </a:p>
@@ -2093,7 +2093,7 @@
           <a:p>
             <a:fld id="{D005D144-FE52-4B88-9017-A322AD8A2886}" type="datetimeFigureOut">
               <a:rPr lang="en-US" smtClean="0"/>
-              <a:t>11-Jan-17</a:t>
+              <a:t>1/11/17</a:t>
             </a:fld>
             <a:endParaRPr lang="en-US"/>
           </a:p>
@@ -2350,7 +2350,7 @@
           <a:p>
             <a:fld id="{D005D144-FE52-4B88-9017-A322AD8A2886}" type="datetimeFigureOut">
               <a:rPr lang="en-US" smtClean="0"/>
-              <a:t>11-Jan-17</a:t>
+              <a:t>1/11/17</a:t>
             </a:fld>
             <a:endParaRPr lang="en-US"/>
           </a:p>
@@ -2612,7 +2612,7 @@
           <a:p>
             <a:fld id="{D005D144-FE52-4B88-9017-A322AD8A2886}" type="datetimeFigureOut">
               <a:rPr lang="en-US" smtClean="0"/>
-              <a:t>11-Jan-17</a:t>
+              <a:t>1/11/17</a:t>
             </a:fld>
             <a:endParaRPr lang="en-US"/>
           </a:p>
@@ -2874,7 +2874,7 @@
           <a:p>
             <a:fld id="{D005D144-FE52-4B88-9017-A322AD8A2886}" type="datetimeFigureOut">
               <a:rPr lang="en-US" smtClean="0"/>
-              <a:t>11-Jan-17</a:t>
+              <a:t>1/11/17</a:t>
             </a:fld>
             <a:endParaRPr lang="en-US"/>
           </a:p>
@@ -3203,7 +3203,7 @@
           <a:p>
             <a:fld id="{D005D144-FE52-4B88-9017-A322AD8A2886}" type="datetimeFigureOut">
               <a:rPr lang="en-US" smtClean="0"/>
-              <a:t>11-Jan-17</a:t>
+              <a:t>1/11/17</a:t>
             </a:fld>
             <a:endParaRPr lang="en-US"/>
           </a:p>
@@ -3526,7 +3526,7 @@
           <a:p>
             <a:fld id="{D005D144-FE52-4B88-9017-A322AD8A2886}" type="datetimeFigureOut">
               <a:rPr lang="en-US" smtClean="0"/>
-              <a:t>11-Jan-17</a:t>
+              <a:t>1/11/17</a:t>
             </a:fld>
             <a:endParaRPr lang="en-US"/>
           </a:p>
@@ -3983,7 +3983,7 @@
           <a:p>
             <a:fld id="{D005D144-FE52-4B88-9017-A322AD8A2886}" type="datetimeFigureOut">
               <a:rPr lang="en-US" smtClean="0"/>
-              <a:t>11-Jan-17</a:t>
+              <a:t>1/11/17</a:t>
             </a:fld>
             <a:endParaRPr lang="en-US"/>
           </a:p>
@@ -4188,7 +4188,7 @@
           <a:p>
             <a:fld id="{D005D144-FE52-4B88-9017-A322AD8A2886}" type="datetimeFigureOut">
               <a:rPr lang="en-US" smtClean="0"/>
-              <a:t>11-Jan-17</a:t>
+              <a:t>1/11/17</a:t>
             </a:fld>
             <a:endParaRPr lang="en-US"/>
           </a:p>
@@ -4365,7 +4365,7 @@
           <a:p>
             <a:fld id="{D005D144-FE52-4B88-9017-A322AD8A2886}" type="datetimeFigureOut">
               <a:rPr lang="en-US" smtClean="0"/>
-              <a:t>11-Jan-17</a:t>
+              <a:t>1/11/17</a:t>
             </a:fld>
             <a:endParaRPr lang="en-US"/>
           </a:p>
@@ -4698,7 +4698,7 @@
           <a:p>
             <a:fld id="{D005D144-FE52-4B88-9017-A322AD8A2886}" type="datetimeFigureOut">
               <a:rPr lang="en-US" smtClean="0"/>
-              <a:t>11-Jan-17</a:t>
+              <a:t>1/11/17</a:t>
             </a:fld>
             <a:endParaRPr lang="en-US"/>
           </a:p>
@@ -5043,7 +5043,7 @@
           <a:p>
             <a:fld id="{D005D144-FE52-4B88-9017-A322AD8A2886}" type="datetimeFigureOut">
               <a:rPr lang="en-US" smtClean="0"/>
-              <a:t>11-Jan-17</a:t>
+              <a:t>1/11/17</a:t>
             </a:fld>
             <a:endParaRPr lang="en-US"/>
           </a:p>
@@ -7160,7 +7160,7 @@
           <a:p>
             <a:fld id="{D005D144-FE52-4B88-9017-A322AD8A2886}" type="datetimeFigureOut">
               <a:rPr lang="en-US" smtClean="0"/>
-              <a:t>11-Jan-17</a:t>
+              <a:t>1/11/17</a:t>
             </a:fld>
             <a:endParaRPr lang="en-US"/>
           </a:p>
@@ -7702,7 +7702,22 @@
           <a:p>
             <a:r>
               <a:rPr lang="nn-NO" b="1" dirty="0"/>
-              <a:t>Web-basert notearkiv for korps og band</a:t>
+              <a:t>Web-basert notearkiv </a:t>
+            </a:r>
+            <a:r>
+              <a:rPr lang="nn-NO" b="1" dirty="0" smtClean="0"/>
+              <a:t/>
+            </a:r>
+            <a:br>
+              <a:rPr lang="nn-NO" b="1" dirty="0" smtClean="0"/>
+            </a:br>
+            <a:r>
+              <a:rPr lang="nn-NO" b="1" dirty="0" smtClean="0"/>
+              <a:t>for </a:t>
+            </a:r>
+            <a:r>
+              <a:rPr lang="nn-NO" b="1" dirty="0"/>
+              <a:t>korps og band</a:t>
             </a:r>
             <a:endParaRPr lang="en-US" dirty="0"/>
           </a:p>
@@ -7720,19 +7735,40 @@
         </p:nvSpPr>
         <p:spPr>
           <a:xfrm>
-            <a:off x="2580336" y="3694304"/>
-            <a:ext cx="8915399" cy="1126283"/>
+            <a:off x="2580336" y="3110753"/>
+            <a:ext cx="7110511" cy="3397623"/>
           </a:xfrm>
         </p:spPr>
         <p:txBody>
           <a:bodyPr>
-            <a:normAutofit lnSpcReduction="10000"/>
+            <a:normAutofit/>
           </a:bodyPr>
           <a:lstStyle/>
           <a:p>
+            <a:pPr marL="285750" indent="-285750">
+              <a:buSzPct val="100000"/>
+              <a:buBlip>
+                <a:blip r:embed="rId2"/>
+              </a:buBlip>
+            </a:pPr>
+            <a:r>
+              <a:rPr lang="nb-NO" b="1" dirty="0" smtClean="0"/>
+              <a:t>Studenter:</a:t>
+            </a:r>
+            <a:r>
+              <a:rPr lang="nb-NO" dirty="0" smtClean="0"/>
+              <a:t/>
+            </a:r>
+            <a:br>
+              <a:rPr lang="nb-NO" dirty="0" smtClean="0"/>
+            </a:br>
+            <a:r>
+              <a:rPr lang="nb-NO" dirty="0" smtClean="0"/>
+              <a:t>Sindre </a:t>
+            </a:r>
             <a:r>
               <a:rPr lang="nb-NO" dirty="0"/>
-              <a:t>Studenter: Sindre Sjøholt, Thomas Robert </a:t>
+              <a:t>Sjøholt, Thomas Robert </a:t>
             </a:r>
             <a:r>
               <a:rPr lang="nb-NO" dirty="0" err="1"/>
@@ -7744,16 +7780,55 @@
             </a:r>
           </a:p>
           <a:p>
+            <a:pPr marL="285750" indent="-285750">
+              <a:buSzPct val="100000"/>
+              <a:buBlip>
+                <a:blip r:embed="rId2"/>
+              </a:buBlip>
+            </a:pPr>
+            <a:r>
+              <a:rPr lang="nb-NO" b="1" dirty="0" smtClean="0"/>
+              <a:t>Oppdragsgiver:</a:t>
+            </a:r>
+            <a:r>
+              <a:rPr lang="nb-NO" dirty="0" smtClean="0"/>
+              <a:t/>
+            </a:r>
+            <a:br>
+              <a:rPr lang="nb-NO" dirty="0" smtClean="0"/>
+            </a:br>
+            <a:r>
+              <a:rPr lang="nb-NO" dirty="0" smtClean="0"/>
+              <a:t>Arne </a:t>
+            </a:r>
             <a:r>
               <a:rPr lang="nb-NO" dirty="0"/>
-              <a:t>Oppdragsgiver: Arne Styve </a:t>
-            </a:r>
-          </a:p>
-          <a:p>
-            <a:r>
-              <a:rPr lang="nb-NO" dirty="0"/>
-              <a:t>Veileder: Arne Styve? </a:t>
-            </a:r>
+              <a:t>Styve </a:t>
+            </a:r>
+          </a:p>
+          <a:p>
+            <a:pPr marL="285750" indent="-285750">
+              <a:buSzPct val="100000"/>
+              <a:buBlip>
+                <a:blip r:embed="rId2"/>
+              </a:buBlip>
+            </a:pPr>
+            <a:r>
+              <a:rPr lang="nb-NO" b="1" dirty="0" smtClean="0"/>
+              <a:t>Veileder:</a:t>
+            </a:r>
+            <a:r>
+              <a:rPr lang="nb-NO" dirty="0" smtClean="0"/>
+              <a:t/>
+            </a:r>
+            <a:br>
+              <a:rPr lang="nb-NO" dirty="0" smtClean="0"/>
+            </a:br>
+            <a:r>
+              <a:rPr lang="nb-NO" dirty="0" smtClean="0"/>
+              <a:t>Arne Styve </a:t>
+            </a:r>
+            <a:endParaRPr lang="nb-NO" dirty="0"/>
           </a:p>
           <a:p>
             <a:endParaRPr lang="nb-NO" dirty="0"/>
@@ -7802,8 +7877,8 @@
         </p:nvSpPr>
         <p:spPr>
           <a:xfrm>
-            <a:off x="1141413" y="265433"/>
-            <a:ext cx="9905998" cy="1478570"/>
+            <a:off x="1622611" y="265433"/>
+            <a:ext cx="9424799" cy="1478570"/>
           </a:xfrm>
         </p:spPr>
         <p:txBody>
@@ -7811,8 +7886,23 @@
           <a:lstStyle/>
           <a:p>
             <a:r>
-              <a:rPr lang="nb-NO" dirty="0"/>
-              <a:t>Beskrivelse av bachelor</a:t>
+              <a:rPr lang="nb-NO" dirty="0" smtClean="0"/>
+              <a:t>	</a:t>
+            </a:r>
+            <a:r>
+              <a:rPr lang="nb-NO" smtClean="0"/>
+              <a:t/>
+            </a:r>
+            <a:br>
+              <a:rPr lang="nb-NO" smtClean="0"/>
+            </a:br>
+            <a:r>
+              <a:rPr lang="nb-NO" smtClean="0"/>
+              <a:t>Kort </a:t>
+            </a:r>
+            <a:r>
+              <a:rPr lang="nb-NO" dirty="0" smtClean="0"/>
+              <a:t>beskrivelse</a:t>
             </a:r>
             <a:endParaRPr lang="en-US" dirty="0"/>
           </a:p>
@@ -7830,45 +7920,148 @@
         </p:nvSpPr>
         <p:spPr>
           <a:xfrm>
-            <a:off x="1141413" y="2000816"/>
-            <a:ext cx="9905998" cy="3790385"/>
+            <a:off x="1622611" y="2000816"/>
+            <a:ext cx="5360895" cy="4668925"/>
           </a:xfrm>
         </p:spPr>
         <p:txBody>
-          <a:bodyPr/>
+          <a:bodyPr>
+            <a:normAutofit lnSpcReduction="10000"/>
+          </a:bodyPr>
           <a:lstStyle/>
           <a:p>
+            <a:pPr>
+              <a:buBlip>
+                <a:blip r:embed="rId2"/>
+              </a:buBlip>
+            </a:pPr>
             <a:r>
               <a:rPr lang="nb-NO" dirty="0"/>
-              <a:t>Web-basert system for håndtering av noter</a:t>
-            </a:r>
-          </a:p>
-          <a:p>
+              <a:t>Web-basert system for håndtering av </a:t>
+            </a:r>
+            <a:r>
+              <a:rPr lang="nb-NO" dirty="0" smtClean="0"/>
+              <a:t>noter for korps og band</a:t>
+            </a:r>
+          </a:p>
+          <a:p>
+            <a:pPr>
+              <a:buBlip>
+                <a:blip r:embed="rId2"/>
+              </a:buBlip>
+            </a:pPr>
+            <a:r>
+              <a:rPr lang="nb-NO" dirty="0" smtClean="0"/>
+              <a:t>Noter på systematiserte og nedlastbare PDF-filer</a:t>
+            </a:r>
+            <a:endParaRPr lang="nb-NO" dirty="0"/>
+          </a:p>
+          <a:p>
+            <a:pPr>
+              <a:buBlip>
+                <a:blip r:embed="rId2"/>
+              </a:buBlip>
+            </a:pPr>
             <a:r>
               <a:rPr lang="nb-NO" dirty="0"/>
-              <a:t>Systemet skal fungere på alle vanlige plattformer</a:t>
-            </a:r>
-          </a:p>
-          <a:p>
+              <a:t>Systemet skal fungere på alle vanlige </a:t>
+            </a:r>
+            <a:r>
+              <a:rPr lang="nb-NO" dirty="0" smtClean="0"/>
+              <a:t>plattformer (mobil, nettbrett, PC osv.)</a:t>
+            </a:r>
+            <a:endParaRPr lang="nb-NO" dirty="0"/>
+          </a:p>
+          <a:p>
+            <a:pPr>
+              <a:buBlip>
+                <a:blip r:embed="rId2"/>
+              </a:buBlip>
+            </a:pPr>
             <a:r>
               <a:rPr lang="nb-NO" dirty="0"/>
-              <a:t>To typer brukere, administrator og bruker</a:t>
-            </a:r>
-          </a:p>
-          <a:p>
+              <a:t>To typer </a:t>
+            </a:r>
+            <a:r>
+              <a:rPr lang="nb-NO" dirty="0" smtClean="0"/>
+              <a:t>brukere; Administrator (ansvarlig for systemet) </a:t>
+            </a:r>
+            <a:r>
+              <a:rPr lang="nb-NO" dirty="0"/>
+              <a:t>og </a:t>
+            </a:r>
+            <a:r>
+              <a:rPr lang="nb-NO" dirty="0" smtClean="0"/>
+              <a:t>Bruker/utøver</a:t>
+            </a:r>
+            <a:endParaRPr lang="nb-NO" dirty="0"/>
+          </a:p>
+          <a:p>
+            <a:pPr>
+              <a:buBlip>
+                <a:blip r:embed="rId2"/>
+              </a:buBlip>
+            </a:pPr>
             <a:r>
               <a:rPr lang="nb-NO" dirty="0"/>
               <a:t>Mer effektivt, bruker- og miljøvennlig enn noter på papir</a:t>
             </a:r>
           </a:p>
           <a:p>
-            <a:r>
-              <a:rPr lang="nb-NO" dirty="0"/>
-              <a:t>Avanserte søk, dele opp PDF filer, </a:t>
-            </a:r>
-          </a:p>
-        </p:txBody>
-      </p:sp>
+            <a:pPr>
+              <a:buBlip>
+                <a:blip r:embed="rId2"/>
+              </a:buBlip>
+            </a:pPr>
+            <a:r>
+              <a:rPr lang="nb-NO" dirty="0" smtClean="0"/>
+              <a:t>Skal kunne gjøre avanserte søk basert på mange kriterier</a:t>
+            </a:r>
+          </a:p>
+          <a:p>
+            <a:pPr>
+              <a:buBlip>
+                <a:blip r:embed="rId2"/>
+              </a:buBlip>
+            </a:pPr>
+            <a:r>
+              <a:rPr lang="nb-NO" dirty="0" smtClean="0"/>
+              <a:t>Skal kunne dele opp PDF-filene etter stemme/instrument etc.</a:t>
+            </a:r>
+            <a:endParaRPr lang="nb-NO" dirty="0"/>
+          </a:p>
+        </p:txBody>
+      </p:sp>
+      <p:pic>
+        <p:nvPicPr>
+          <p:cNvPr id="4" name="Bilde 3"/>
+          <p:cNvPicPr>
+            <a:picLocks noChangeAspect="1"/>
+          </p:cNvPicPr>
+          <p:nvPr/>
+        </p:nvPicPr>
+        <p:blipFill>
+          <a:blip r:embed="rId3">
+            <a:extLst>
+              <a:ext uri="{28A0092B-C50C-407E-A947-70E740481C1C}">
+                <a14:useLocalDpi xmlns:a14="http://schemas.microsoft.com/office/drawing/2010/main" val="0"/>
+              </a:ext>
+            </a:extLst>
+          </a:blip>
+          <a:stretch>
+            <a:fillRect/>
+          </a:stretch>
+        </p:blipFill>
+        <p:spPr>
+          <a:xfrm>
+            <a:off x="7178400" y="2000816"/>
+            <a:ext cx="3869010" cy="3857105"/>
+          </a:xfrm>
+          <a:prstGeom prst="rect">
+            <a:avLst/>
+          </a:prstGeom>
+        </p:spPr>
+      </p:pic>
     </p:spTree>
     <p:extLst>
       <p:ext uri="{BB962C8B-B14F-4D97-AF65-F5344CB8AC3E}">
@@ -7909,11 +8102,23 @@
             <p:ph type="title"/>
           </p:nvPr>
         </p:nvSpPr>
-        <p:spPr/>
+        <p:spPr>
+          <a:xfrm>
+            <a:off x="1631577" y="624110"/>
+            <a:ext cx="9873036" cy="1280890"/>
+          </a:xfrm>
+        </p:spPr>
         <p:txBody>
           <a:bodyPr/>
           <a:lstStyle/>
           <a:p>
+            <a:r>
+              <a:rPr lang="en-US" dirty="0" smtClean="0"/>
+              <a:t/>
+            </a:r>
+            <a:br>
+              <a:rPr lang="en-US" dirty="0" smtClean="0"/>
+            </a:br>
             <a:endParaRPr lang="en-US" dirty="0"/>
           </a:p>
         </p:txBody>
@@ -7928,37 +8133,131 @@
             <p:ph idx="1"/>
           </p:nvPr>
         </p:nvSpPr>
-        <p:spPr/>
+        <p:spPr>
+          <a:xfrm>
+            <a:off x="1631577" y="2054117"/>
+            <a:ext cx="5513293" cy="3857105"/>
+          </a:xfrm>
+        </p:spPr>
         <p:txBody>
           <a:bodyPr/>
           <a:lstStyle/>
           <a:p>
+            <a:pPr>
+              <a:buBlip>
+                <a:blip r:embed="rId2"/>
+              </a:buBlip>
+            </a:pPr>
+            <a:r>
+              <a:rPr lang="nb-NO" b="1" dirty="0" smtClean="0"/>
+              <a:t>Målsetting:</a:t>
+            </a:r>
+            <a:r>
+              <a:rPr lang="nb-NO" dirty="0" smtClean="0"/>
+              <a:t/>
+            </a:r>
+            <a:br>
+              <a:rPr lang="nb-NO" dirty="0" smtClean="0"/>
+            </a:br>
+            <a:r>
+              <a:rPr lang="nb-NO" dirty="0" smtClean="0"/>
+              <a:t>Lage </a:t>
+            </a:r>
             <a:r>
               <a:rPr lang="nb-NO" dirty="0"/>
-              <a:t>Målsetting: Lage et fungerende, sikkert og brukervennlig web-basert notearkiv</a:t>
-            </a:r>
-          </a:p>
-          <a:p>
-            <a:r>
-              <a:rPr lang="nb-NO" dirty="0"/>
-              <a:t>Problemstillinger: </a:t>
-            </a:r>
-          </a:p>
-          <a:p>
-            <a:r>
-              <a:rPr lang="nb-NO" dirty="0"/>
-              <a:t>Utfordringer:  </a:t>
-            </a:r>
-            <a:r>
-              <a:rPr lang="nb-NO" dirty="0"/>
-              <a:t>Størrelse, sikkerhet og funksjonalitet i database og server. Brukervennlighet på alle plattformer og alle brukere. </a:t>
-            </a:r>
-          </a:p>
-          <a:p>
+              <a:t>et fungerende, sikkert og brukervennlig web-basert notearkiv</a:t>
+            </a:r>
+          </a:p>
+          <a:p>
+            <a:pPr>
+              <a:buBlip>
+                <a:blip r:embed="rId2"/>
+              </a:buBlip>
+            </a:pPr>
+            <a:r>
+              <a:rPr lang="nb-NO" b="1" dirty="0" smtClean="0"/>
+              <a:t>Utfordringer og problemstillinger:</a:t>
+            </a:r>
             <a:endParaRPr lang="nb-NO" dirty="0"/>
           </a:p>
-        </p:txBody>
-      </p:sp>
+          <a:p>
+            <a:pPr lvl="1">
+              <a:buFont typeface="Arial" charset="0"/>
+              <a:buChar char="•"/>
+            </a:pPr>
+            <a:r>
+              <a:rPr lang="nb-NO" dirty="0" smtClean="0"/>
+              <a:t>Utvikle en brukervennlig løsning tilpasset alle vanlige plattformer </a:t>
+            </a:r>
+          </a:p>
+          <a:p>
+            <a:pPr lvl="1">
+              <a:buFont typeface="Arial" charset="0"/>
+              <a:buChar char="•"/>
+            </a:pPr>
+            <a:r>
+              <a:rPr lang="nb-NO" dirty="0" smtClean="0"/>
+              <a:t>Utvikle en løsning med god tilgjengelighet </a:t>
+            </a:r>
+            <a:r>
+              <a:rPr lang="mr-IN" dirty="0" smtClean="0"/>
+              <a:t>–</a:t>
+            </a:r>
+            <a:r>
+              <a:rPr lang="nb-NO" dirty="0" smtClean="0"/>
+              <a:t> også for de med nedsatt funksjonsevne (universell utforming)</a:t>
+            </a:r>
+            <a:endParaRPr lang="nb-NO" dirty="0" smtClean="0"/>
+          </a:p>
+          <a:p>
+            <a:pPr lvl="1">
+              <a:buFont typeface="Arial" charset="0"/>
+              <a:buChar char="•"/>
+            </a:pPr>
+            <a:r>
+              <a:rPr lang="nb-NO" dirty="0" smtClean="0"/>
+              <a:t>Utvikle en sikker og funksjonell server- og databaseløsning</a:t>
+            </a:r>
+          </a:p>
+          <a:p>
+            <a:pPr lvl="1">
+              <a:buFont typeface="Arial" charset="0"/>
+              <a:buChar char="•"/>
+            </a:pPr>
+            <a:endParaRPr lang="nb-NO" dirty="0" smtClean="0"/>
+          </a:p>
+        </p:txBody>
+      </p:sp>
+      <p:pic>
+        <p:nvPicPr>
+          <p:cNvPr id="6" name="Bilde 5"/>
+          <p:cNvPicPr>
+            <a:picLocks noChangeAspect="1"/>
+          </p:cNvPicPr>
+          <p:nvPr/>
+        </p:nvPicPr>
+        <p:blipFill>
+          <a:blip r:embed="rId3">
+            <a:extLst>
+              <a:ext uri="{28A0092B-C50C-407E-A947-70E740481C1C}">
+                <a14:useLocalDpi xmlns:a14="http://schemas.microsoft.com/office/drawing/2010/main" val="0"/>
+              </a:ext>
+            </a:extLst>
+          </a:blip>
+          <a:stretch>
+            <a:fillRect/>
+          </a:stretch>
+        </p:blipFill>
+        <p:spPr>
+          <a:xfrm>
+            <a:off x="7277012" y="2054117"/>
+            <a:ext cx="3869010" cy="3857105"/>
+          </a:xfrm>
+          <a:prstGeom prst="rect">
+            <a:avLst/>
+          </a:prstGeom>
+        </p:spPr>
+      </p:pic>
     </p:spTree>
     <p:extLst>
       <p:ext uri="{BB962C8B-B14F-4D97-AF65-F5344CB8AC3E}">

</xml_diff>